<commit_message>
update my student id in ppt
</commit_message>
<xml_diff>
--- a/系統分析/系統分析期中報告.pptx
+++ b/系統分析/系統分析期中報告.pptx
@@ -124,7 +124,7 @@
   </p:defaultTextStyle>
   <p:extLst>
     <p:ext uri="{EFAFB233-063F-42B5-8137-9DF3F51BA10A}">
-      <p15:sldGuideLst xmlns:p15="http://schemas.microsoft.com/office/powerpoint/2012/main">
+      <p15:sldGuideLst xmlns:p15="http://schemas.microsoft.com/office/powerpoint/2012/main" xmlns="">
         <p15:guide id="1" orient="horz" pos="1620">
           <p15:clr>
             <a:srgbClr val="A4A3A4"/>
@@ -223,7 +223,7 @@
           <a:p>
             <a:fld id="{4ABF6D0B-8263-8241-BF99-08149363C526}" type="datetimeFigureOut">
               <a:rPr lang="en-US" smtClean="0"/>
-              <a:t>4/22/18</a:t>
+              <a:t>4/24/2018</a:t>
             </a:fld>
             <a:endParaRPr lang="en-US"/>
           </a:p>
@@ -534,6 +534,94 @@
           <a:bodyPr/>
           <a:lstStyle/>
           <a:p>
+            <a:r>
+              <a:rPr lang="zh-CN" altLang="en-US" dirty="0" smtClean="0"/>
+              <a:t>第一階至第零階的處理與資料流整合</a:t>
+            </a:r>
+            <a:endParaRPr lang="en-MY" dirty="0"/>
+          </a:p>
+        </p:txBody>
+      </p:sp>
+      <p:sp>
+        <p:nvSpPr>
+          <p:cNvPr id="4" name="Slide Number Placeholder 3"/>
+          <p:cNvSpPr>
+            <a:spLocks noGrp="1"/>
+          </p:cNvSpPr>
+          <p:nvPr>
+            <p:ph type="sldNum" sz="quarter" idx="10"/>
+          </p:nvPr>
+        </p:nvSpPr>
+        <p:spPr/>
+        <p:txBody>
+          <a:bodyPr/>
+          <a:lstStyle/>
+          <a:p>
+            <a:fld id="{296C4F53-6BE1-5844-B3C4-6E34DA698919}" type="slidenum">
+              <a:rPr lang="en-US" smtClean="0"/>
+              <a:t>10</a:t>
+            </a:fld>
+            <a:endParaRPr lang="en-US"/>
+          </a:p>
+        </p:txBody>
+      </p:sp>
+    </p:spTree>
+    <p:extLst>
+      <p:ext uri="{BB962C8B-B14F-4D97-AF65-F5344CB8AC3E}">
+        <p14:creationId xmlns:p14="http://schemas.microsoft.com/office/powerpoint/2010/main" val="199383415"/>
+      </p:ext>
+    </p:extLst>
+  </p:cSld>
+  <p:clrMapOvr>
+    <a:masterClrMapping/>
+  </p:clrMapOvr>
+</p:notes>
+</file>
+
+<file path=ppt/notesSlides/notesSlide2.xml><?xml version="1.0" encoding="utf-8"?>
+<p:notes xmlns:a="http://schemas.openxmlformats.org/drawingml/2006/main" xmlns:r="http://schemas.openxmlformats.org/officeDocument/2006/relationships" xmlns:p="http://schemas.openxmlformats.org/presentationml/2006/main">
+  <p:cSld>
+    <p:spTree>
+      <p:nvGrpSpPr>
+        <p:cNvPr id="1" name=""/>
+        <p:cNvGrpSpPr/>
+        <p:nvPr/>
+      </p:nvGrpSpPr>
+      <p:grpSpPr>
+        <a:xfrm>
+          <a:off x="0" y="0"/>
+          <a:ext cx="0" cy="0"/>
+          <a:chOff x="0" y="0"/>
+          <a:chExt cx="0" cy="0"/>
+        </a:xfrm>
+      </p:grpSpPr>
+      <p:sp>
+        <p:nvSpPr>
+          <p:cNvPr id="2" name="Slide Image Placeholder 1"/>
+          <p:cNvSpPr>
+            <a:spLocks noGrp="1" noRot="1" noChangeAspect="1"/>
+          </p:cNvSpPr>
+          <p:nvPr>
+            <p:ph type="sldImg"/>
+          </p:nvPr>
+        </p:nvSpPr>
+        <p:spPr/>
+      </p:sp>
+      <p:sp>
+        <p:nvSpPr>
+          <p:cNvPr id="3" name="Notes Placeholder 2"/>
+          <p:cNvSpPr>
+            <a:spLocks noGrp="1"/>
+          </p:cNvSpPr>
+          <p:nvPr>
+            <p:ph type="body" idx="1"/>
+          </p:nvPr>
+        </p:nvSpPr>
+        <p:spPr/>
+        <p:txBody>
+          <a:bodyPr/>
+          <a:lstStyle/>
+          <a:p>
             <a:endParaRPr lang="en-US" dirty="0"/>
           </a:p>
         </p:txBody>
@@ -652,7 +740,7 @@
           <a:p>
             <a:fld id="{63937D59-5EDB-4C39-B697-625748F703B6}" type="datetimeFigureOut">
               <a:rPr lang="en-US" smtClean="0"/>
-              <a:t>4/22/18</a:t>
+              <a:t>4/24/2018</a:t>
             </a:fld>
             <a:endParaRPr lang="en-US"/>
           </a:p>
@@ -927,7 +1015,7 @@
           <a:p>
             <a:fld id="{63937D59-5EDB-4C39-B697-625748F703B6}" type="datetimeFigureOut">
               <a:rPr lang="en-US" smtClean="0"/>
-              <a:t>4/22/18</a:t>
+              <a:t>4/24/2018</a:t>
             </a:fld>
             <a:endParaRPr lang="en-US"/>
           </a:p>
@@ -1179,7 +1267,7 @@
           <a:p>
             <a:fld id="{63937D59-5EDB-4C39-B697-625748F703B6}" type="datetimeFigureOut">
               <a:rPr lang="en-US" smtClean="0"/>
-              <a:t>4/22/18</a:t>
+              <a:t>4/24/2018</a:t>
             </a:fld>
             <a:endParaRPr lang="en-US"/>
           </a:p>
@@ -1347,7 +1435,7 @@
           <a:p>
             <a:fld id="{63937D59-5EDB-4C39-B697-625748F703B6}" type="datetimeFigureOut">
               <a:rPr lang="en-US" smtClean="0"/>
-              <a:t>4/22/18</a:t>
+              <a:t>4/24/2018</a:t>
             </a:fld>
             <a:endParaRPr lang="en-US"/>
           </a:p>
@@ -1525,7 +1613,7 @@
           <a:p>
             <a:fld id="{63937D59-5EDB-4C39-B697-625748F703B6}" type="datetimeFigureOut">
               <a:rPr lang="en-US" smtClean="0"/>
-              <a:t>4/22/18</a:t>
+              <a:t>4/24/2018</a:t>
             </a:fld>
             <a:endParaRPr lang="en-US"/>
           </a:p>
@@ -2103,7 +2191,7 @@
           <a:p>
             <a:fld id="{63937D59-5EDB-4C39-B697-625748F703B6}" type="datetimeFigureOut">
               <a:rPr lang="en-US" smtClean="0"/>
-              <a:t>4/22/18</a:t>
+              <a:t>4/24/2018</a:t>
             </a:fld>
             <a:endParaRPr lang="en-US"/>
           </a:p>
@@ -2271,7 +2359,7 @@
           <a:p>
             <a:fld id="{63937D59-5EDB-4C39-B697-625748F703B6}" type="datetimeFigureOut">
               <a:rPr lang="en-US" smtClean="0"/>
-              <a:t>4/22/18</a:t>
+              <a:t>4/24/2018</a:t>
             </a:fld>
             <a:endParaRPr lang="en-US"/>
           </a:p>
@@ -2516,7 +2604,7 @@
           <a:p>
             <a:fld id="{63937D59-5EDB-4C39-B697-625748F703B6}" type="datetimeFigureOut">
               <a:rPr lang="en-US" smtClean="0"/>
-              <a:t>4/22/18</a:t>
+              <a:t>4/24/2018</a:t>
             </a:fld>
             <a:endParaRPr lang="en-US"/>
           </a:p>
@@ -2801,7 +2889,7 @@
           <a:p>
             <a:fld id="{63937D59-5EDB-4C39-B697-625748F703B6}" type="datetimeFigureOut">
               <a:rPr lang="en-US" smtClean="0"/>
-              <a:t>4/22/18</a:t>
+              <a:t>4/24/2018</a:t>
             </a:fld>
             <a:endParaRPr lang="en-US"/>
           </a:p>
@@ -3220,7 +3308,7 @@
           <a:p>
             <a:fld id="{63937D59-5EDB-4C39-B697-625748F703B6}" type="datetimeFigureOut">
               <a:rPr lang="en-US" smtClean="0"/>
-              <a:t>4/22/18</a:t>
+              <a:t>4/24/2018</a:t>
             </a:fld>
             <a:endParaRPr lang="en-US"/>
           </a:p>
@@ -3337,7 +3425,7 @@
           <a:p>
             <a:fld id="{63937D59-5EDB-4C39-B697-625748F703B6}" type="datetimeFigureOut">
               <a:rPr lang="en-US" smtClean="0"/>
-              <a:t>4/22/18</a:t>
+              <a:t>4/24/2018</a:t>
             </a:fld>
             <a:endParaRPr lang="en-US"/>
           </a:p>
@@ -3839,7 +3927,7 @@
           <a:p>
             <a:fld id="{63937D59-5EDB-4C39-B697-625748F703B6}" type="datetimeFigureOut">
               <a:rPr lang="en-US" smtClean="0"/>
-              <a:t>4/22/18</a:t>
+              <a:t>4/24/2018</a:t>
             </a:fld>
             <a:endParaRPr lang="en-US"/>
           </a:p>
@@ -4370,7 +4458,21 @@
                 <a:latin typeface="Arial" pitchFamily="34" charset="0"/>
                 <a:cs typeface="Arial" pitchFamily="34" charset="0"/>
               </a:rPr>
-              <a:t>陳欣惠</a:t>
+              <a:t>陳欣</a:t>
+            </a:r>
+            <a:r>
+              <a:rPr kumimoji="0" lang="zh-Hant" altLang="en-US" sz="1400" b="1" dirty="0" smtClean="0">
+                <a:latin typeface="Arial" pitchFamily="34" charset="0"/>
+                <a:cs typeface="Arial" pitchFamily="34" charset="0"/>
+              </a:rPr>
+              <a:t>惠 </a:t>
+            </a:r>
+            <a:r>
+              <a:rPr kumimoji="0" lang="en-US" altLang="zh-Hant" sz="1400" b="1" dirty="0" smtClean="0">
+                <a:latin typeface="Arial" pitchFamily="34" charset="0"/>
+                <a:cs typeface="Arial" pitchFamily="34" charset="0"/>
+              </a:rPr>
+              <a:t>D0527783</a:t>
             </a:r>
             <a:endParaRPr kumimoji="0" lang="en-US" altLang="zh-Hant" sz="1400" b="1" dirty="0">
               <a:latin typeface="Arial" pitchFamily="34" charset="0"/>
@@ -4511,7 +4613,7 @@
           <p:cNvPr id="15" name="Title 1">
             <a:extLst>
               <a:ext uri="{FF2B5EF4-FFF2-40B4-BE49-F238E27FC236}">
-                <a16:creationId xmlns:a16="http://schemas.microsoft.com/office/drawing/2014/main" id="{F4C4A796-8AEB-7641-8B55-458C4FE2D291}"/>
+                <a16:creationId xmlns:a16="http://schemas.microsoft.com/office/drawing/2014/main" xmlns="" id="{F4C4A796-8AEB-7641-8B55-458C4FE2D291}"/>
               </a:ext>
             </a:extLst>
           </p:cNvPr>
@@ -4569,7 +4671,7 @@
           <p:cNvPr id="31" name="Picture 30">
             <a:extLst>
               <a:ext uri="{FF2B5EF4-FFF2-40B4-BE49-F238E27FC236}">
-                <a16:creationId xmlns:a16="http://schemas.microsoft.com/office/drawing/2014/main" id="{4FFEC185-6FEF-3F42-8084-C69259FD5ADA}"/>
+                <a16:creationId xmlns:a16="http://schemas.microsoft.com/office/drawing/2014/main" xmlns="" id="{4FFEC185-6FEF-3F42-8084-C69259FD5ADA}"/>
               </a:ext>
             </a:extLst>
           </p:cNvPr>
@@ -4605,7 +4707,7 @@
           <p:cNvPr id="33" name="Picture 32">
             <a:extLst>
               <a:ext uri="{FF2B5EF4-FFF2-40B4-BE49-F238E27FC236}">
-                <a16:creationId xmlns:a16="http://schemas.microsoft.com/office/drawing/2014/main" id="{74DE0983-9153-194E-8E13-5F518B0C2D8A}"/>
+                <a16:creationId xmlns:a16="http://schemas.microsoft.com/office/drawing/2014/main" xmlns="" id="{74DE0983-9153-194E-8E13-5F518B0C2D8A}"/>
               </a:ext>
             </a:extLst>
           </p:cNvPr>
@@ -4641,7 +4743,7 @@
           <p:cNvPr id="34" name="Arrow: Down 128">
             <a:extLst>
               <a:ext uri="{FF2B5EF4-FFF2-40B4-BE49-F238E27FC236}">
-                <a16:creationId xmlns:a16="http://schemas.microsoft.com/office/drawing/2014/main" id="{007661F0-5D1F-F14E-AEA8-08A4A330E6D1}"/>
+                <a16:creationId xmlns:a16="http://schemas.microsoft.com/office/drawing/2014/main" xmlns="" id="{007661F0-5D1F-F14E-AEA8-08A4A330E6D1}"/>
               </a:ext>
             </a:extLst>
           </p:cNvPr>
@@ -4691,7 +4793,7 @@
           <p:cNvPr id="35" name="Rectangle 34">
             <a:extLst>
               <a:ext uri="{FF2B5EF4-FFF2-40B4-BE49-F238E27FC236}">
-                <a16:creationId xmlns:a16="http://schemas.microsoft.com/office/drawing/2014/main" id="{45A947F6-B5AC-4F42-A660-15042FC37403}"/>
+                <a16:creationId xmlns:a16="http://schemas.microsoft.com/office/drawing/2014/main" xmlns="" id="{45A947F6-B5AC-4F42-A660-15042FC37403}"/>
               </a:ext>
             </a:extLst>
           </p:cNvPr>
@@ -4791,7 +4893,7 @@
           <p:cNvPr id="9" name="Content Placeholder 6">
             <a:extLst>
               <a:ext uri="{FF2B5EF4-FFF2-40B4-BE49-F238E27FC236}">
-                <a16:creationId xmlns:a16="http://schemas.microsoft.com/office/drawing/2014/main" id="{65B99FB5-8778-7F44-9454-FB20081C092A}"/>
+                <a16:creationId xmlns:a16="http://schemas.microsoft.com/office/drawing/2014/main" xmlns="" id="{65B99FB5-8778-7F44-9454-FB20081C092A}"/>
               </a:ext>
             </a:extLst>
           </p:cNvPr>
@@ -4803,7 +4905,7 @@
           </p:nvPr>
         </p:nvPicPr>
         <p:blipFill>
-          <a:blip r:embed="rId3">
+          <a:blip r:embed="rId2" cstate="print">
             <a:extLst>
               <a:ext uri="{28A0092B-C50C-407E-A947-70E740481C1C}">
                 <a14:useLocalDpi xmlns:a14="http://schemas.microsoft.com/office/drawing/2010/main" val="0"/>
@@ -4826,7 +4928,7 @@
           <p:cNvPr id="10" name="Picture 9">
             <a:extLst>
               <a:ext uri="{FF2B5EF4-FFF2-40B4-BE49-F238E27FC236}">
-                <a16:creationId xmlns:a16="http://schemas.microsoft.com/office/drawing/2014/main" id="{F1251362-201C-3E43-822F-4765AF33BA16}"/>
+                <a16:creationId xmlns:a16="http://schemas.microsoft.com/office/drawing/2014/main" xmlns="" id="{F1251362-201C-3E43-822F-4765AF33BA16}"/>
               </a:ext>
             </a:extLst>
           </p:cNvPr>
@@ -4834,7 +4936,7 @@
           <p:nvPr/>
         </p:nvPicPr>
         <p:blipFill>
-          <a:blip r:embed="rId4">
+          <a:blip r:embed="rId3">
             <a:extLst>
               <a:ext uri="{28A0092B-C50C-407E-A947-70E740481C1C}">
                 <a14:useLocalDpi xmlns:a14="http://schemas.microsoft.com/office/drawing/2010/main" val="0"/>
@@ -4863,7 +4965,7 @@
           <p:cNvPr id="11" name="Bent-Up Arrow 10">
             <a:extLst>
               <a:ext uri="{FF2B5EF4-FFF2-40B4-BE49-F238E27FC236}">
-                <a16:creationId xmlns:a16="http://schemas.microsoft.com/office/drawing/2014/main" id="{25C3EAC7-84DE-5D42-B13D-495D0184D8CA}"/>
+                <a16:creationId xmlns:a16="http://schemas.microsoft.com/office/drawing/2014/main" xmlns="" id="{25C3EAC7-84DE-5D42-B13D-495D0184D8CA}"/>
               </a:ext>
             </a:extLst>
           </p:cNvPr>
@@ -4909,7 +5011,7 @@
           <p:cNvPr id="12" name="Rectangle 11">
             <a:extLst>
               <a:ext uri="{FF2B5EF4-FFF2-40B4-BE49-F238E27FC236}">
-                <a16:creationId xmlns:a16="http://schemas.microsoft.com/office/drawing/2014/main" id="{241CE9AE-2559-F941-8795-C1BC68F0E16C}"/>
+                <a16:creationId xmlns:a16="http://schemas.microsoft.com/office/drawing/2014/main" xmlns="" id="{241CE9AE-2559-F941-8795-C1BC68F0E16C}"/>
               </a:ext>
             </a:extLst>
           </p:cNvPr>
@@ -4958,7 +5060,7 @@
           <p:cNvPr id="14" name="Rectangle 13">
             <a:extLst>
               <a:ext uri="{FF2B5EF4-FFF2-40B4-BE49-F238E27FC236}">
-                <a16:creationId xmlns:a16="http://schemas.microsoft.com/office/drawing/2014/main" id="{214AA10B-4D75-F14A-A46F-83D47C738BFA}"/>
+                <a16:creationId xmlns:a16="http://schemas.microsoft.com/office/drawing/2014/main" xmlns="" id="{214AA10B-4D75-F14A-A46F-83D47C738BFA}"/>
               </a:ext>
             </a:extLst>
           </p:cNvPr>
@@ -5062,7 +5164,7 @@
           <p:cNvPr id="15" name="Title 1">
             <a:extLst>
               <a:ext uri="{FF2B5EF4-FFF2-40B4-BE49-F238E27FC236}">
-                <a16:creationId xmlns:a16="http://schemas.microsoft.com/office/drawing/2014/main" id="{F4C4A796-8AEB-7641-8B55-458C4FE2D291}"/>
+                <a16:creationId xmlns:a16="http://schemas.microsoft.com/office/drawing/2014/main" xmlns="" id="{F4C4A796-8AEB-7641-8B55-458C4FE2D291}"/>
               </a:ext>
             </a:extLst>
           </p:cNvPr>
@@ -5112,7 +5214,7 @@
           <p:cNvPr id="34" name="Arrow: Down 128">
             <a:extLst>
               <a:ext uri="{FF2B5EF4-FFF2-40B4-BE49-F238E27FC236}">
-                <a16:creationId xmlns:a16="http://schemas.microsoft.com/office/drawing/2014/main" id="{007661F0-5D1F-F14E-AEA8-08A4A330E6D1}"/>
+                <a16:creationId xmlns:a16="http://schemas.microsoft.com/office/drawing/2014/main" xmlns="" id="{007661F0-5D1F-F14E-AEA8-08A4A330E6D1}"/>
               </a:ext>
             </a:extLst>
           </p:cNvPr>
@@ -5162,7 +5264,7 @@
           <p:cNvPr id="35" name="Rectangle 34">
             <a:extLst>
               <a:ext uri="{FF2B5EF4-FFF2-40B4-BE49-F238E27FC236}">
-                <a16:creationId xmlns:a16="http://schemas.microsoft.com/office/drawing/2014/main" id="{45A947F6-B5AC-4F42-A660-15042FC37403}"/>
+                <a16:creationId xmlns:a16="http://schemas.microsoft.com/office/drawing/2014/main" xmlns="" id="{45A947F6-B5AC-4F42-A660-15042FC37403}"/>
               </a:ext>
             </a:extLst>
           </p:cNvPr>
@@ -5204,7 +5306,7 @@
           <p:cNvPr id="6" name="Picture 5">
             <a:extLst>
               <a:ext uri="{FF2B5EF4-FFF2-40B4-BE49-F238E27FC236}">
-                <a16:creationId xmlns:a16="http://schemas.microsoft.com/office/drawing/2014/main" id="{9952234D-A5A3-9646-8FD0-040AE91DB55F}"/>
+                <a16:creationId xmlns:a16="http://schemas.microsoft.com/office/drawing/2014/main" xmlns="" id="{9952234D-A5A3-9646-8FD0-040AE91DB55F}"/>
               </a:ext>
             </a:extLst>
           </p:cNvPr>
@@ -5214,7 +5316,7 @@
           <p:nvPr/>
         </p:nvPicPr>
         <p:blipFill>
-          <a:blip r:embed="rId4">
+          <a:blip r:embed="rId3">
             <a:extLst>
               <a:ext uri="{28A0092B-C50C-407E-A947-70E740481C1C}">
                 <a14:useLocalDpi xmlns:a14="http://schemas.microsoft.com/office/drawing/2010/main" val="0"/>
@@ -5240,7 +5342,7 @@
           <p:cNvPr id="8" name="Picture 7">
             <a:extLst>
               <a:ext uri="{FF2B5EF4-FFF2-40B4-BE49-F238E27FC236}">
-                <a16:creationId xmlns:a16="http://schemas.microsoft.com/office/drawing/2014/main" id="{041BCA3A-636B-B848-9EA7-7FCBEAA61954}"/>
+                <a16:creationId xmlns:a16="http://schemas.microsoft.com/office/drawing/2014/main" xmlns="" id="{041BCA3A-636B-B848-9EA7-7FCBEAA61954}"/>
               </a:ext>
             </a:extLst>
           </p:cNvPr>
@@ -5250,7 +5352,7 @@
           <p:nvPr/>
         </p:nvPicPr>
         <p:blipFill>
-          <a:blip r:embed="rId5">
+          <a:blip r:embed="rId4">
             <a:extLst>
               <a:ext uri="{28A0092B-C50C-407E-A947-70E740481C1C}">
                 <a14:useLocalDpi xmlns:a14="http://schemas.microsoft.com/office/drawing/2010/main" val="0"/>
@@ -5334,7 +5436,7 @@
           <p:cNvPr id="2" name="Rectangle 1">
             <a:extLst>
               <a:ext uri="{FF2B5EF4-FFF2-40B4-BE49-F238E27FC236}">
-                <a16:creationId xmlns:a16="http://schemas.microsoft.com/office/drawing/2014/main" id="{EB48C46F-EDFC-EB4B-B22B-751E02B2BD81}"/>
+                <a16:creationId xmlns:a16="http://schemas.microsoft.com/office/drawing/2014/main" xmlns="" id="{EB48C46F-EDFC-EB4B-B22B-751E02B2BD81}"/>
               </a:ext>
             </a:extLst>
           </p:cNvPr>
@@ -5383,7 +5485,7 @@
           <p:cNvPr id="3" name="Picture 2">
             <a:extLst>
               <a:ext uri="{FF2B5EF4-FFF2-40B4-BE49-F238E27FC236}">
-                <a16:creationId xmlns:a16="http://schemas.microsoft.com/office/drawing/2014/main" id="{8228CACA-4A23-9C4B-8BD6-E34BCE5CF66B}"/>
+                <a16:creationId xmlns:a16="http://schemas.microsoft.com/office/drawing/2014/main" xmlns="" id="{8228CACA-4A23-9C4B-8BD6-E34BCE5CF66B}"/>
               </a:ext>
             </a:extLst>
           </p:cNvPr>
@@ -5391,7 +5493,7 @@
           <p:nvPr/>
         </p:nvPicPr>
         <p:blipFill>
-          <a:blip r:embed="rId3">
+          <a:blip r:embed="rId2">
             <a:extLst>
               <a:ext uri="{28A0092B-C50C-407E-A947-70E740481C1C}">
                 <a14:useLocalDpi xmlns:a14="http://schemas.microsoft.com/office/drawing/2010/main" val="0"/>
@@ -5483,7 +5585,7 @@
           <p:cNvPr id="11" name="Picture 10">
             <a:extLst>
               <a:ext uri="{FF2B5EF4-FFF2-40B4-BE49-F238E27FC236}">
-                <a16:creationId xmlns:a16="http://schemas.microsoft.com/office/drawing/2014/main" id="{7AD26D1F-531B-CD4D-B741-1E4D51D50455}"/>
+                <a16:creationId xmlns:a16="http://schemas.microsoft.com/office/drawing/2014/main" xmlns="" id="{7AD26D1F-531B-CD4D-B741-1E4D51D50455}"/>
               </a:ext>
             </a:extLst>
           </p:cNvPr>
@@ -5491,7 +5593,7 @@
           <p:nvPr/>
         </p:nvPicPr>
         <p:blipFill>
-          <a:blip r:embed="rId3">
+          <a:blip r:embed="rId2">
             <a:extLst>
               <a:ext uri="{28A0092B-C50C-407E-A947-70E740481C1C}">
                 <a14:useLocalDpi xmlns:a14="http://schemas.microsoft.com/office/drawing/2010/main" val="0"/>
@@ -5517,7 +5619,7 @@
           <p:cNvPr id="12" name="Rectangle 11">
             <a:extLst>
               <a:ext uri="{FF2B5EF4-FFF2-40B4-BE49-F238E27FC236}">
-                <a16:creationId xmlns:a16="http://schemas.microsoft.com/office/drawing/2014/main" id="{C97B75BD-EF10-C44A-A586-429A6292B44D}"/>
+                <a16:creationId xmlns:a16="http://schemas.microsoft.com/office/drawing/2014/main" xmlns="" id="{C97B75BD-EF10-C44A-A586-429A6292B44D}"/>
               </a:ext>
             </a:extLst>
           </p:cNvPr>
@@ -5680,7 +5782,7 @@
           <p:cNvPr id="8" name="Content Placeholder 7">
             <a:extLst>
               <a:ext uri="{FF2B5EF4-FFF2-40B4-BE49-F238E27FC236}">
-                <a16:creationId xmlns:a16="http://schemas.microsoft.com/office/drawing/2014/main" id="{D0F58796-F20D-2740-A72A-4E167EE31200}"/>
+                <a16:creationId xmlns:a16="http://schemas.microsoft.com/office/drawing/2014/main" xmlns="" id="{D0F58796-F20D-2740-A72A-4E167EE31200}"/>
               </a:ext>
             </a:extLst>
           </p:cNvPr>
@@ -5698,7 +5800,7 @@
         </p:nvGraphicFramePr>
         <p:xfrm>
           <a:off x="1255135" y="843558"/>
-          <a:ext cx="6633730" cy="4060953"/>
+          <a:ext cx="6633730" cy="4072609"/>
         </p:xfrm>
         <a:graphic>
           <a:graphicData uri="http://schemas.openxmlformats.org/drawingml/2006/table">
@@ -5710,14 +5812,14 @@
                 <a:gridCol w="3316865">
                   <a:extLst>
                     <a:ext uri="{9D8B030D-6E8A-4147-A177-3AD203B41FA5}">
-                      <a16:colId xmlns:a16="http://schemas.microsoft.com/office/drawing/2014/main" val="4170412860"/>
+                      <a16:colId xmlns:a16="http://schemas.microsoft.com/office/drawing/2014/main" xmlns="" val="4170412860"/>
                     </a:ext>
                   </a:extLst>
                 </a:gridCol>
                 <a:gridCol w="3316865">
                   <a:extLst>
                     <a:ext uri="{9D8B030D-6E8A-4147-A177-3AD203B41FA5}">
-                      <a16:colId xmlns:a16="http://schemas.microsoft.com/office/drawing/2014/main" val="4227658176"/>
+                      <a16:colId xmlns:a16="http://schemas.microsoft.com/office/drawing/2014/main" xmlns="" val="4227658176"/>
                     </a:ext>
                   </a:extLst>
                 </a:gridCol>
@@ -5797,7 +5899,7 @@
                 </a:tc>
                 <a:extLst>
                   <a:ext uri="{0D108BD9-81ED-4DB2-BD59-A6C34878D82A}">
-                    <a16:rowId xmlns:a16="http://schemas.microsoft.com/office/drawing/2014/main" val="608201287"/>
+                    <a16:rowId xmlns:a16="http://schemas.microsoft.com/office/drawing/2014/main" xmlns="" val="608201287"/>
                   </a:ext>
                 </a:extLst>
               </a:tr>
@@ -6404,7 +6506,7 @@
                 </a:tc>
                 <a:extLst>
                   <a:ext uri="{0D108BD9-81ED-4DB2-BD59-A6C34878D82A}">
-                    <a16:rowId xmlns:a16="http://schemas.microsoft.com/office/drawing/2014/main" val="2915758028"/>
+                    <a16:rowId xmlns:a16="http://schemas.microsoft.com/office/drawing/2014/main" xmlns="" val="2915758028"/>
                   </a:ext>
                 </a:extLst>
               </a:tr>
@@ -6753,7 +6855,7 @@
                 </a:tc>
                 <a:extLst>
                   <a:ext uri="{0D108BD9-81ED-4DB2-BD59-A6C34878D82A}">
-                    <a16:rowId xmlns:a16="http://schemas.microsoft.com/office/drawing/2014/main" val="4263870807"/>
+                    <a16:rowId xmlns:a16="http://schemas.microsoft.com/office/drawing/2014/main" xmlns="" val="4263870807"/>
                   </a:ext>
                 </a:extLst>
               </a:tr>
@@ -6766,7 +6868,7 @@
           <p:cNvPr id="9" name="Title 1">
             <a:extLst>
               <a:ext uri="{FF2B5EF4-FFF2-40B4-BE49-F238E27FC236}">
-                <a16:creationId xmlns:a16="http://schemas.microsoft.com/office/drawing/2014/main" id="{C31DB15B-7C35-8E4A-98EF-B2D7793BE7F1}"/>
+                <a16:creationId xmlns:a16="http://schemas.microsoft.com/office/drawing/2014/main" xmlns="" id="{C31DB15B-7C35-8E4A-98EF-B2D7793BE7F1}"/>
               </a:ext>
             </a:extLst>
           </p:cNvPr>
@@ -6914,7 +7016,7 @@
           <p:cNvPr id="2" name="Title 1">
             <a:extLst>
               <a:ext uri="{FF2B5EF4-FFF2-40B4-BE49-F238E27FC236}">
-                <a16:creationId xmlns:a16="http://schemas.microsoft.com/office/drawing/2014/main" id="{5DE67083-97B1-0448-8E01-02F477F3C7EB}"/>
+                <a16:creationId xmlns:a16="http://schemas.microsoft.com/office/drawing/2014/main" xmlns="" id="{5DE67083-97B1-0448-8E01-02F477F3C7EB}"/>
               </a:ext>
             </a:extLst>
           </p:cNvPr>
@@ -6956,7 +7058,7 @@
           <p:cNvPr id="5" name="Content Placeholder 4">
             <a:extLst>
               <a:ext uri="{FF2B5EF4-FFF2-40B4-BE49-F238E27FC236}">
-                <a16:creationId xmlns:a16="http://schemas.microsoft.com/office/drawing/2014/main" id="{BF551C20-977F-5D49-A5D4-CA3BAEE2078F}"/>
+                <a16:creationId xmlns:a16="http://schemas.microsoft.com/office/drawing/2014/main" xmlns="" id="{BF551C20-977F-5D49-A5D4-CA3BAEE2078F}"/>
               </a:ext>
             </a:extLst>
           </p:cNvPr>
@@ -7052,7 +7154,7 @@
           <p:cNvPr id="5" name="Content Placeholder 4">
             <a:extLst>
               <a:ext uri="{FF2B5EF4-FFF2-40B4-BE49-F238E27FC236}">
-                <a16:creationId xmlns:a16="http://schemas.microsoft.com/office/drawing/2014/main" id="{34E024CD-D143-6144-9F2E-85B8187FB907}"/>
+                <a16:creationId xmlns:a16="http://schemas.microsoft.com/office/drawing/2014/main" xmlns="" id="{34E024CD-D143-6144-9F2E-85B8187FB907}"/>
               </a:ext>
             </a:extLst>
           </p:cNvPr>
@@ -7090,7 +7192,7 @@
           <p:cNvPr id="6" name="Picture 5">
             <a:extLst>
               <a:ext uri="{FF2B5EF4-FFF2-40B4-BE49-F238E27FC236}">
-                <a16:creationId xmlns:a16="http://schemas.microsoft.com/office/drawing/2014/main" id="{BBC23686-A54D-3948-970F-F39190C7947D}"/>
+                <a16:creationId xmlns:a16="http://schemas.microsoft.com/office/drawing/2014/main" xmlns="" id="{BBC23686-A54D-3948-970F-F39190C7947D}"/>
               </a:ext>
             </a:extLst>
           </p:cNvPr>
@@ -7124,7 +7226,7 @@
           <p:cNvPr id="9" name="Down Arrow 8">
             <a:extLst>
               <a:ext uri="{FF2B5EF4-FFF2-40B4-BE49-F238E27FC236}">
-                <a16:creationId xmlns:a16="http://schemas.microsoft.com/office/drawing/2014/main" id="{EEF4B0DB-5DA9-5D40-A305-3CC05FEA97C4}"/>
+                <a16:creationId xmlns:a16="http://schemas.microsoft.com/office/drawing/2014/main" xmlns="" id="{EEF4B0DB-5DA9-5D40-A305-3CC05FEA97C4}"/>
               </a:ext>
             </a:extLst>
           </p:cNvPr>
@@ -7170,7 +7272,7 @@
           <p:cNvPr id="15" name="Title 1">
             <a:extLst>
               <a:ext uri="{FF2B5EF4-FFF2-40B4-BE49-F238E27FC236}">
-                <a16:creationId xmlns:a16="http://schemas.microsoft.com/office/drawing/2014/main" id="{F4C4A796-8AEB-7641-8B55-458C4FE2D291}"/>
+                <a16:creationId xmlns:a16="http://schemas.microsoft.com/office/drawing/2014/main" xmlns="" id="{F4C4A796-8AEB-7641-8B55-458C4FE2D291}"/>
               </a:ext>
             </a:extLst>
           </p:cNvPr>
@@ -7294,7 +7396,7 @@
           <p:cNvPr id="9" name="Down Arrow 8">
             <a:extLst>
               <a:ext uri="{FF2B5EF4-FFF2-40B4-BE49-F238E27FC236}">
-                <a16:creationId xmlns:a16="http://schemas.microsoft.com/office/drawing/2014/main" id="{EEF4B0DB-5DA9-5D40-A305-3CC05FEA97C4}"/>
+                <a16:creationId xmlns:a16="http://schemas.microsoft.com/office/drawing/2014/main" xmlns="" id="{EEF4B0DB-5DA9-5D40-A305-3CC05FEA97C4}"/>
               </a:ext>
             </a:extLst>
           </p:cNvPr>
@@ -7340,7 +7442,7 @@
           <p:cNvPr id="15" name="Title 1">
             <a:extLst>
               <a:ext uri="{FF2B5EF4-FFF2-40B4-BE49-F238E27FC236}">
-                <a16:creationId xmlns:a16="http://schemas.microsoft.com/office/drawing/2014/main" id="{F4C4A796-8AEB-7641-8B55-458C4FE2D291}"/>
+                <a16:creationId xmlns:a16="http://schemas.microsoft.com/office/drawing/2014/main" xmlns="" id="{F4C4A796-8AEB-7641-8B55-458C4FE2D291}"/>
               </a:ext>
             </a:extLst>
           </p:cNvPr>
@@ -7406,7 +7508,7 @@
           <p:cNvPr id="8" name="Picture 7">
             <a:extLst>
               <a:ext uri="{FF2B5EF4-FFF2-40B4-BE49-F238E27FC236}">
-                <a16:creationId xmlns:a16="http://schemas.microsoft.com/office/drawing/2014/main" id="{49D1363A-6243-6A4B-AF55-C10C2EFCDC21}"/>
+                <a16:creationId xmlns:a16="http://schemas.microsoft.com/office/drawing/2014/main" xmlns="" id="{49D1363A-6243-6A4B-AF55-C10C2EFCDC21}"/>
               </a:ext>
             </a:extLst>
           </p:cNvPr>
@@ -7414,7 +7516,7 @@
           <p:nvPr/>
         </p:nvPicPr>
         <p:blipFill>
-          <a:blip r:embed="rId2">
+          <a:blip r:embed="rId2" cstate="print">
             <a:extLst>
               <a:ext uri="{28A0092B-C50C-407E-A947-70E740481C1C}">
                 <a14:useLocalDpi xmlns:a14="http://schemas.microsoft.com/office/drawing/2010/main" val="0"/>
@@ -7440,7 +7542,7 @@
           <p:cNvPr id="10" name="Picture 9">
             <a:extLst>
               <a:ext uri="{FF2B5EF4-FFF2-40B4-BE49-F238E27FC236}">
-                <a16:creationId xmlns:a16="http://schemas.microsoft.com/office/drawing/2014/main" id="{5B7994C7-D4E8-4C4E-AA71-0106FD979C8A}"/>
+                <a16:creationId xmlns:a16="http://schemas.microsoft.com/office/drawing/2014/main" xmlns="" id="{5B7994C7-D4E8-4C4E-AA71-0106FD979C8A}"/>
               </a:ext>
             </a:extLst>
           </p:cNvPr>
@@ -7532,7 +7634,7 @@
           <p:cNvPr id="15" name="Title 1">
             <a:extLst>
               <a:ext uri="{FF2B5EF4-FFF2-40B4-BE49-F238E27FC236}">
-                <a16:creationId xmlns:a16="http://schemas.microsoft.com/office/drawing/2014/main" id="{F4C4A796-8AEB-7641-8B55-458C4FE2D291}"/>
+                <a16:creationId xmlns:a16="http://schemas.microsoft.com/office/drawing/2014/main" xmlns="" id="{F4C4A796-8AEB-7641-8B55-458C4FE2D291}"/>
               </a:ext>
             </a:extLst>
           </p:cNvPr>
@@ -7574,7 +7676,7 @@
           <p:cNvPr id="13" name="Object 12">
             <a:extLst>
               <a:ext uri="{FF2B5EF4-FFF2-40B4-BE49-F238E27FC236}">
-                <a16:creationId xmlns:a16="http://schemas.microsoft.com/office/drawing/2014/main" id="{DB914DDF-21ED-D342-968B-D15374B57C19}"/>
+                <a16:creationId xmlns:a16="http://schemas.microsoft.com/office/drawing/2014/main" xmlns="" id="{DB914DDF-21ED-D342-968B-D15374B57C19}"/>
               </a:ext>
             </a:extLst>
           </p:cNvPr>
@@ -7597,7 +7699,7 @@
           <a:graphicData uri="http://schemas.openxmlformats.org/presentationml/2006/ole">
             <mc:AlternateContent xmlns:mc="http://schemas.openxmlformats.org/markup-compatibility/2006">
               <mc:Choice xmlns:v="urn:schemas-microsoft-com:vml" Requires="v">
-                <p:oleObj spid="_x0000_s2057" name="Document" r:id="rId3" imgW="6921500" imgH="1333500" progId="Word.Document.12">
+                <p:oleObj spid="_x0000_s2058" name="Document" r:id="rId3" imgW="6921500" imgH="1333500" progId="Word.Document.12">
                   <p:embed/>
                 </p:oleObj>
               </mc:Choice>
@@ -7637,7 +7739,7 @@
           <p:cNvPr id="16" name="Rectangle 15">
             <a:extLst>
               <a:ext uri="{FF2B5EF4-FFF2-40B4-BE49-F238E27FC236}">
-                <a16:creationId xmlns:a16="http://schemas.microsoft.com/office/drawing/2014/main" id="{E196E731-7B44-5748-8622-8F33F1FB9AE8}"/>
+                <a16:creationId xmlns:a16="http://schemas.microsoft.com/office/drawing/2014/main" xmlns="" id="{E196E731-7B44-5748-8622-8F33F1FB9AE8}"/>
               </a:ext>
             </a:extLst>
           </p:cNvPr>
@@ -7672,7 +7774,7 @@
           <p:cNvPr id="17" name="Rectangle 16">
             <a:extLst>
               <a:ext uri="{FF2B5EF4-FFF2-40B4-BE49-F238E27FC236}">
-                <a16:creationId xmlns:a16="http://schemas.microsoft.com/office/drawing/2014/main" id="{AF632D80-4D78-DA4D-A95F-73C5BD52E449}"/>
+                <a16:creationId xmlns:a16="http://schemas.microsoft.com/office/drawing/2014/main" xmlns="" id="{AF632D80-4D78-DA4D-A95F-73C5BD52E449}"/>
               </a:ext>
             </a:extLst>
           </p:cNvPr>
@@ -7821,7 +7923,7 @@
           <p:cNvPr id="15" name="Title 1">
             <a:extLst>
               <a:ext uri="{FF2B5EF4-FFF2-40B4-BE49-F238E27FC236}">
-                <a16:creationId xmlns:a16="http://schemas.microsoft.com/office/drawing/2014/main" id="{F4C4A796-8AEB-7641-8B55-458C4FE2D291}"/>
+                <a16:creationId xmlns:a16="http://schemas.microsoft.com/office/drawing/2014/main" xmlns="" id="{F4C4A796-8AEB-7641-8B55-458C4FE2D291}"/>
               </a:ext>
             </a:extLst>
           </p:cNvPr>
@@ -7863,7 +7965,7 @@
           <p:cNvPr id="8" name="Picture 7">
             <a:extLst>
               <a:ext uri="{FF2B5EF4-FFF2-40B4-BE49-F238E27FC236}">
-                <a16:creationId xmlns:a16="http://schemas.microsoft.com/office/drawing/2014/main" id="{A575FBA1-D496-934A-AE00-290AA7595822}"/>
+                <a16:creationId xmlns:a16="http://schemas.microsoft.com/office/drawing/2014/main" xmlns="" id="{A575FBA1-D496-934A-AE00-290AA7595822}"/>
               </a:ext>
             </a:extLst>
           </p:cNvPr>
@@ -7957,7 +8059,7 @@
           <p:cNvPr id="15" name="Title 1">
             <a:extLst>
               <a:ext uri="{FF2B5EF4-FFF2-40B4-BE49-F238E27FC236}">
-                <a16:creationId xmlns:a16="http://schemas.microsoft.com/office/drawing/2014/main" id="{F4C4A796-8AEB-7641-8B55-458C4FE2D291}"/>
+                <a16:creationId xmlns:a16="http://schemas.microsoft.com/office/drawing/2014/main" xmlns="" id="{F4C4A796-8AEB-7641-8B55-458C4FE2D291}"/>
               </a:ext>
             </a:extLst>
           </p:cNvPr>
@@ -7999,7 +8101,7 @@
           <p:cNvPr id="3" name="Picture 2">
             <a:extLst>
               <a:ext uri="{FF2B5EF4-FFF2-40B4-BE49-F238E27FC236}">
-                <a16:creationId xmlns:a16="http://schemas.microsoft.com/office/drawing/2014/main" id="{D0DDB850-3EB4-D64D-8FC9-01CDCA1B5E7A}"/>
+                <a16:creationId xmlns:a16="http://schemas.microsoft.com/office/drawing/2014/main" xmlns="" id="{D0DDB850-3EB4-D64D-8FC9-01CDCA1B5E7A}"/>
               </a:ext>
             </a:extLst>
           </p:cNvPr>
@@ -8093,7 +8195,7 @@
           <p:cNvPr id="15" name="Title 1">
             <a:extLst>
               <a:ext uri="{FF2B5EF4-FFF2-40B4-BE49-F238E27FC236}">
-                <a16:creationId xmlns:a16="http://schemas.microsoft.com/office/drawing/2014/main" id="{F4C4A796-8AEB-7641-8B55-458C4FE2D291}"/>
+                <a16:creationId xmlns:a16="http://schemas.microsoft.com/office/drawing/2014/main" xmlns="" id="{F4C4A796-8AEB-7641-8B55-458C4FE2D291}"/>
               </a:ext>
             </a:extLst>
           </p:cNvPr>
@@ -8135,7 +8237,7 @@
           <p:cNvPr id="3" name="Picture 2">
             <a:extLst>
               <a:ext uri="{FF2B5EF4-FFF2-40B4-BE49-F238E27FC236}">
-                <a16:creationId xmlns:a16="http://schemas.microsoft.com/office/drawing/2014/main" id="{C89FF32C-708B-A246-A4A9-3A91DF58208B}"/>
+                <a16:creationId xmlns:a16="http://schemas.microsoft.com/office/drawing/2014/main" xmlns="" id="{C89FF32C-708B-A246-A4A9-3A91DF58208B}"/>
               </a:ext>
             </a:extLst>
           </p:cNvPr>
@@ -9038,7 +9140,7 @@
   <a:extraClrSchemeLst/>
   <a:extLst>
     <a:ext uri="{05A4C25C-085E-4340-85A3-A5531E510DB2}">
-      <thm15:themeFamily xmlns:thm15="http://schemas.microsoft.com/office/thememl/2012/main" name="Office Theme" id="{62F939B6-93AF-4DB8-9C6B-D6C7DFDC589F}" vid="{4A3C46E8-61CC-4603-A589-7422A47A8E4A}"/>
+      <thm15:themeFamily xmlns:thm15="http://schemas.microsoft.com/office/thememl/2012/main" xmlns="" name="Office Theme" id="{62F939B6-93AF-4DB8-9C6B-D6C7DFDC589F}" vid="{4A3C46E8-61CC-4603-A589-7422A47A8E4A}"/>
     </a:ext>
   </a:extLst>
 </a:theme>

</xml_diff>